<commit_message>
update Readme usage figures
</commit_message>
<xml_diff>
--- a/man/figures/ct.pptx
+++ b/man/figures/ct.pptx
@@ -257,7 +257,7 @@
           <a:p>
             <a:fld id="{FC2A4E39-15D1-44B4-BD6C-D53416EADD39}" type="datetimeFigureOut">
               <a:rPr lang="fr-FR" smtClean="0"/>
-              <a:t>14/11/2021</a:t>
+              <a:t>27/12/2021</a:t>
             </a:fld>
             <a:endParaRPr lang="fr-FR"/>
           </a:p>
@@ -427,7 +427,7 @@
           <a:p>
             <a:fld id="{FC2A4E39-15D1-44B4-BD6C-D53416EADD39}" type="datetimeFigureOut">
               <a:rPr lang="fr-FR" smtClean="0"/>
-              <a:t>14/11/2021</a:t>
+              <a:t>27/12/2021</a:t>
             </a:fld>
             <a:endParaRPr lang="fr-FR"/>
           </a:p>
@@ -607,7 +607,7 @@
           <a:p>
             <a:fld id="{FC2A4E39-15D1-44B4-BD6C-D53416EADD39}" type="datetimeFigureOut">
               <a:rPr lang="fr-FR" smtClean="0"/>
-              <a:t>14/11/2021</a:t>
+              <a:t>27/12/2021</a:t>
             </a:fld>
             <a:endParaRPr lang="fr-FR"/>
           </a:p>
@@ -777,7 +777,7 @@
           <a:p>
             <a:fld id="{FC2A4E39-15D1-44B4-BD6C-D53416EADD39}" type="datetimeFigureOut">
               <a:rPr lang="fr-FR" smtClean="0"/>
-              <a:t>14/11/2021</a:t>
+              <a:t>27/12/2021</a:t>
             </a:fld>
             <a:endParaRPr lang="fr-FR"/>
           </a:p>
@@ -1023,7 +1023,7 @@
           <a:p>
             <a:fld id="{FC2A4E39-15D1-44B4-BD6C-D53416EADD39}" type="datetimeFigureOut">
               <a:rPr lang="fr-FR" smtClean="0"/>
-              <a:t>14/11/2021</a:t>
+              <a:t>27/12/2021</a:t>
             </a:fld>
             <a:endParaRPr lang="fr-FR"/>
           </a:p>
@@ -1255,7 +1255,7 @@
           <a:p>
             <a:fld id="{FC2A4E39-15D1-44B4-BD6C-D53416EADD39}" type="datetimeFigureOut">
               <a:rPr lang="fr-FR" smtClean="0"/>
-              <a:t>14/11/2021</a:t>
+              <a:t>27/12/2021</a:t>
             </a:fld>
             <a:endParaRPr lang="fr-FR"/>
           </a:p>
@@ -1622,7 +1622,7 @@
           <a:p>
             <a:fld id="{FC2A4E39-15D1-44B4-BD6C-D53416EADD39}" type="datetimeFigureOut">
               <a:rPr lang="fr-FR" smtClean="0"/>
-              <a:t>14/11/2021</a:t>
+              <a:t>27/12/2021</a:t>
             </a:fld>
             <a:endParaRPr lang="fr-FR"/>
           </a:p>
@@ -1740,7 +1740,7 @@
           <a:p>
             <a:fld id="{FC2A4E39-15D1-44B4-BD6C-D53416EADD39}" type="datetimeFigureOut">
               <a:rPr lang="fr-FR" smtClean="0"/>
-              <a:t>14/11/2021</a:t>
+              <a:t>27/12/2021</a:t>
             </a:fld>
             <a:endParaRPr lang="fr-FR"/>
           </a:p>
@@ -1835,7 +1835,7 @@
           <a:p>
             <a:fld id="{FC2A4E39-15D1-44B4-BD6C-D53416EADD39}" type="datetimeFigureOut">
               <a:rPr lang="fr-FR" smtClean="0"/>
-              <a:t>14/11/2021</a:t>
+              <a:t>27/12/2021</a:t>
             </a:fld>
             <a:endParaRPr lang="fr-FR"/>
           </a:p>
@@ -2112,7 +2112,7 @@
           <a:p>
             <a:fld id="{FC2A4E39-15D1-44B4-BD6C-D53416EADD39}" type="datetimeFigureOut">
               <a:rPr lang="fr-FR" smtClean="0"/>
-              <a:t>14/11/2021</a:t>
+              <a:t>27/12/2021</a:t>
             </a:fld>
             <a:endParaRPr lang="fr-FR"/>
           </a:p>
@@ -2369,7 +2369,7 @@
           <a:p>
             <a:fld id="{FC2A4E39-15D1-44B4-BD6C-D53416EADD39}" type="datetimeFigureOut">
               <a:rPr lang="fr-FR" smtClean="0"/>
-              <a:t>14/11/2021</a:t>
+              <a:t>27/12/2021</a:t>
             </a:fld>
             <a:endParaRPr lang="fr-FR"/>
           </a:p>
@@ -2582,7 +2582,7 @@
           <a:p>
             <a:fld id="{FC2A4E39-15D1-44B4-BD6C-D53416EADD39}" type="datetimeFigureOut">
               <a:rPr lang="fr-FR" smtClean="0"/>
-              <a:t>14/11/2021</a:t>
+              <a:t>27/12/2021</a:t>
             </a:fld>
             <a:endParaRPr lang="fr-FR"/>
           </a:p>
@@ -3795,8 +3795,8 @@
         </p:blipFill>
         <p:spPr>
           <a:xfrm>
-            <a:off x="4843811" y="1610835"/>
-            <a:ext cx="13070781" cy="6643054"/>
+            <a:off x="3485788" y="1114102"/>
+            <a:ext cx="19328300" cy="7636520"/>
           </a:xfrm>
           <a:prstGeom prst="rect">
             <a:avLst/>
@@ -3805,10 +3805,10 @@
       </p:pic>
       <p:grpSp>
         <p:nvGrpSpPr>
-          <p:cNvPr id="27" name="Groupe 26">
+          <p:cNvPr id="7" name="Groupe 6">
             <a:extLst>
               <a:ext uri="{FF2B5EF4-FFF2-40B4-BE49-F238E27FC236}">
-                <a16:creationId xmlns:a16="http://schemas.microsoft.com/office/drawing/2014/main" id="{CFBA0367-5962-4655-B25F-5AE4E493C03D}"/>
+                <a16:creationId xmlns:a16="http://schemas.microsoft.com/office/drawing/2014/main" id="{B9B6AEE0-46C5-4580-B04D-B907CE1DFBE2}"/>
               </a:ext>
             </a:extLst>
           </p:cNvPr>
@@ -3817,18 +3817,18 @@
         </p:nvGrpSpPr>
         <p:grpSpPr>
           <a:xfrm>
-            <a:off x="17890923" y="1864629"/>
-            <a:ext cx="2048175" cy="1196495"/>
-            <a:chOff x="18797954" y="523221"/>
-            <a:chExt cx="3166505" cy="1336431"/>
+            <a:off x="44685" y="3282486"/>
+            <a:ext cx="3536546" cy="817352"/>
+            <a:chOff x="1174393" y="2497715"/>
+            <a:chExt cx="3536546" cy="817352"/>
           </a:xfrm>
         </p:grpSpPr>
         <p:sp>
           <p:nvSpPr>
-            <p:cNvPr id="22" name="ZoneTexte 21">
+            <p:cNvPr id="52" name="ZoneTexte 51">
               <a:extLst>
                 <a:ext uri="{FF2B5EF4-FFF2-40B4-BE49-F238E27FC236}">
-                  <a16:creationId xmlns:a16="http://schemas.microsoft.com/office/drawing/2014/main" id="{F77A039C-1C55-4149-AA03-9AD4583F89E9}"/>
+                  <a16:creationId xmlns:a16="http://schemas.microsoft.com/office/drawing/2014/main" id="{9DED810E-C537-4E8E-8020-6D240AE284E7}"/>
                 </a:ext>
               </a:extLst>
             </p:cNvPr>
@@ -3837,13 +3837,357 @@
           </p:nvSpPr>
           <p:spPr>
             <a:xfrm>
-              <a:off x="19299830" y="931985"/>
-              <a:ext cx="2664629" cy="414389"/>
+              <a:off x="1174393" y="2791847"/>
+              <a:ext cx="3536546" cy="523220"/>
             </a:xfrm>
             <a:prstGeom prst="rect">
               <a:avLst/>
             </a:prstGeom>
             <a:noFill/>
+            <a:ln>
+              <a:solidFill>
+                <a:schemeClr val="tx1">
+                  <a:lumMod val="85000"/>
+                  <a:lumOff val="15000"/>
+                </a:schemeClr>
+              </a:solidFill>
+            </a:ln>
+          </p:spPr>
+          <p:txBody>
+            <a:bodyPr wrap="none" rtlCol="0" anchor="ctr">
+              <a:spAutoFit/>
+            </a:bodyPr>
+            <a:lstStyle/>
+            <a:p>
+              <a:r>
+                <a:rPr lang="fr-FR" sz="2800" dirty="0" err="1">
+                  <a:solidFill>
+                    <a:schemeClr val="tx2">
+                      <a:lumMod val="75000"/>
+                    </a:schemeClr>
+                  </a:solidFill>
+                  <a:latin typeface="Consolas" panose="020B0609020204030204" pitchFamily="49" charset="0"/>
+                </a:rPr>
+                <a:t>starts_with</a:t>
+              </a:r>
+              <a:r>
+                <a:rPr lang="fr-FR" sz="2800" dirty="0">
+                  <a:solidFill>
+                    <a:schemeClr val="tx2">
+                      <a:lumMod val="75000"/>
+                    </a:schemeClr>
+                  </a:solidFill>
+                  <a:latin typeface="Consolas" panose="020B0609020204030204" pitchFamily="49" charset="0"/>
+                </a:rPr>
+                <a:t>("</a:t>
+              </a:r>
+              <a:r>
+                <a:rPr lang="fr-FR" sz="2800" dirty="0" err="1">
+                  <a:solidFill>
+                    <a:schemeClr val="tx2">
+                      <a:lumMod val="75000"/>
+                    </a:schemeClr>
+                  </a:solidFill>
+                  <a:latin typeface="Consolas" panose="020B0609020204030204" pitchFamily="49" charset="0"/>
+                </a:rPr>
+                <a:t>cy</a:t>
+              </a:r>
+              <a:r>
+                <a:rPr lang="fr-FR" sz="2800" dirty="0">
+                  <a:solidFill>
+                    <a:schemeClr val="tx2">
+                      <a:lumMod val="75000"/>
+                    </a:schemeClr>
+                  </a:solidFill>
+                  <a:latin typeface="Consolas" panose="020B0609020204030204" pitchFamily="49" charset="0"/>
+                </a:rPr>
+                <a:t>")</a:t>
+              </a:r>
+            </a:p>
+          </p:txBody>
+        </p:sp>
+        <p:cxnSp>
+          <p:nvCxnSpPr>
+            <p:cNvPr id="56" name="Connecteur droit avec flèche 55">
+              <a:extLst>
+                <a:ext uri="{FF2B5EF4-FFF2-40B4-BE49-F238E27FC236}">
+                  <a16:creationId xmlns:a16="http://schemas.microsoft.com/office/drawing/2014/main" id="{6D0132BF-F57A-4B09-9A4B-28E309A5F215}"/>
+                </a:ext>
+              </a:extLst>
+            </p:cNvPr>
+            <p:cNvCxnSpPr>
+              <a:cxnSpLocks/>
+            </p:cNvCxnSpPr>
+            <p:nvPr/>
+          </p:nvCxnSpPr>
+          <p:spPr>
+            <a:xfrm flipV="1">
+              <a:off x="4072120" y="2497715"/>
+              <a:ext cx="638819" cy="246881"/>
+            </a:xfrm>
+            <a:prstGeom prst="straightConnector1">
+              <a:avLst/>
+            </a:prstGeom>
+            <a:ln w="76200">
+              <a:solidFill>
+                <a:schemeClr val="tx2">
+                  <a:lumMod val="75000"/>
+                </a:schemeClr>
+              </a:solidFill>
+              <a:tailEnd type="triangle"/>
+            </a:ln>
+          </p:spPr>
+          <p:style>
+            <a:lnRef idx="1">
+              <a:schemeClr val="accent1"/>
+            </a:lnRef>
+            <a:fillRef idx="0">
+              <a:schemeClr val="accent1"/>
+            </a:fillRef>
+            <a:effectRef idx="0">
+              <a:schemeClr val="accent1"/>
+            </a:effectRef>
+            <a:fontRef idx="minor">
+              <a:schemeClr val="tx1"/>
+            </a:fontRef>
+          </p:style>
+        </p:cxnSp>
+      </p:grpSp>
+      <p:grpSp>
+        <p:nvGrpSpPr>
+          <p:cNvPr id="10" name="Groupe 9">
+            <a:extLst>
+              <a:ext uri="{FF2B5EF4-FFF2-40B4-BE49-F238E27FC236}">
+                <a16:creationId xmlns:a16="http://schemas.microsoft.com/office/drawing/2014/main" id="{A6B0BE07-3358-42A9-AC62-15E998F935FE}"/>
+              </a:ext>
+            </a:extLst>
+          </p:cNvPr>
+          <p:cNvGrpSpPr/>
+          <p:nvPr/>
+        </p:nvGrpSpPr>
+        <p:grpSpPr>
+          <a:xfrm>
+            <a:off x="240509" y="7519849"/>
+            <a:ext cx="4522392" cy="1606257"/>
+            <a:chOff x="568458" y="5220786"/>
+            <a:chExt cx="4522392" cy="1606257"/>
+          </a:xfrm>
+        </p:grpSpPr>
+        <p:sp>
+          <p:nvSpPr>
+            <p:cNvPr id="77" name="ZoneTexte 76">
+              <a:extLst>
+                <a:ext uri="{FF2B5EF4-FFF2-40B4-BE49-F238E27FC236}">
+                  <a16:creationId xmlns:a16="http://schemas.microsoft.com/office/drawing/2014/main" id="{08DF0282-5912-417D-86E7-BBD71B821EF9}"/>
+                </a:ext>
+              </a:extLst>
+            </p:cNvPr>
+            <p:cNvSpPr txBox="1"/>
+            <p:nvPr/>
+          </p:nvSpPr>
+          <p:spPr>
+            <a:xfrm>
+              <a:off x="568458" y="6303823"/>
+              <a:ext cx="4522392" cy="523220"/>
+            </a:xfrm>
+            <a:prstGeom prst="rect">
+              <a:avLst/>
+            </a:prstGeom>
+            <a:noFill/>
+            <a:ln>
+              <a:solidFill>
+                <a:schemeClr val="tx1">
+                  <a:lumMod val="85000"/>
+                  <a:lumOff val="15000"/>
+                </a:schemeClr>
+              </a:solidFill>
+            </a:ln>
+          </p:spPr>
+          <p:txBody>
+            <a:bodyPr wrap="none" rtlCol="0" anchor="ctr">
+              <a:spAutoFit/>
+            </a:bodyPr>
+            <a:lstStyle/>
+            <a:p>
+              <a:r>
+                <a:rPr lang="fr-FR" sz="2800" dirty="0">
+                  <a:solidFill>
+                    <a:schemeClr val="tx2">
+                      <a:lumMod val="75000"/>
+                    </a:schemeClr>
+                  </a:solidFill>
+                  <a:latin typeface="Consolas" panose="020B0609020204030204" pitchFamily="49" charset="0"/>
+                </a:rPr>
+                <a:t>funs=c(</a:t>
+              </a:r>
+              <a:r>
+                <a:rPr lang="fr-FR" sz="2800" dirty="0" err="1">
+                  <a:solidFill>
+                    <a:schemeClr val="tx2">
+                      <a:lumMod val="75000"/>
+                    </a:schemeClr>
+                  </a:solidFill>
+                  <a:latin typeface="Consolas" panose="020B0609020204030204" pitchFamily="49" charset="0"/>
+                </a:rPr>
+                <a:t>mean</a:t>
+              </a:r>
+              <a:r>
+                <a:rPr lang="fr-FR" sz="2800" dirty="0">
+                  <a:solidFill>
+                    <a:schemeClr val="tx2">
+                      <a:lumMod val="75000"/>
+                    </a:schemeClr>
+                  </a:solidFill>
+                  <a:latin typeface="Consolas" panose="020B0609020204030204" pitchFamily="49" charset="0"/>
+                </a:rPr>
+                <a:t>, quantile)</a:t>
+              </a:r>
+            </a:p>
+          </p:txBody>
+        </p:sp>
+        <p:cxnSp>
+          <p:nvCxnSpPr>
+            <p:cNvPr id="78" name="Connecteur droit avec flèche 77">
+              <a:extLst>
+                <a:ext uri="{FF2B5EF4-FFF2-40B4-BE49-F238E27FC236}">
+                  <a16:creationId xmlns:a16="http://schemas.microsoft.com/office/drawing/2014/main" id="{013FD60E-4552-4928-B46E-7282B386C41A}"/>
+                </a:ext>
+              </a:extLst>
+            </p:cNvPr>
+            <p:cNvCxnSpPr>
+              <a:cxnSpLocks/>
+            </p:cNvCxnSpPr>
+            <p:nvPr/>
+          </p:nvCxnSpPr>
+          <p:spPr>
+            <a:xfrm flipV="1">
+              <a:off x="2782863" y="5220786"/>
+              <a:ext cx="1754074" cy="1078878"/>
+            </a:xfrm>
+            <a:prstGeom prst="straightConnector1">
+              <a:avLst/>
+            </a:prstGeom>
+            <a:ln w="76200">
+              <a:solidFill>
+                <a:schemeClr val="tx2">
+                  <a:lumMod val="75000"/>
+                </a:schemeClr>
+              </a:solidFill>
+              <a:tailEnd type="triangle"/>
+            </a:ln>
+          </p:spPr>
+          <p:style>
+            <a:lnRef idx="1">
+              <a:schemeClr val="accent1"/>
+            </a:lnRef>
+            <a:fillRef idx="0">
+              <a:schemeClr val="accent1"/>
+            </a:fillRef>
+            <a:effectRef idx="0">
+              <a:schemeClr val="accent1"/>
+            </a:effectRef>
+            <a:fontRef idx="minor">
+              <a:schemeClr val="tx1"/>
+            </a:fontRef>
+          </p:style>
+        </p:cxnSp>
+      </p:grpSp>
+      <p:grpSp>
+        <p:nvGrpSpPr>
+          <p:cNvPr id="12" name="Groupe 11">
+            <a:extLst>
+              <a:ext uri="{FF2B5EF4-FFF2-40B4-BE49-F238E27FC236}">
+                <a16:creationId xmlns:a16="http://schemas.microsoft.com/office/drawing/2014/main" id="{FA657DCD-1B45-4AFA-8A8E-22A92D3F3795}"/>
+              </a:ext>
+            </a:extLst>
+          </p:cNvPr>
+          <p:cNvGrpSpPr/>
+          <p:nvPr/>
+        </p:nvGrpSpPr>
+        <p:grpSpPr>
+          <a:xfrm>
+            <a:off x="16117264" y="7917462"/>
+            <a:ext cx="2550698" cy="1243220"/>
+            <a:chOff x="13708580" y="7642648"/>
+            <a:chExt cx="2550698" cy="1243220"/>
+          </a:xfrm>
+        </p:grpSpPr>
+        <p:cxnSp>
+          <p:nvCxnSpPr>
+            <p:cNvPr id="81" name="Connecteur droit avec flèche 80">
+              <a:extLst>
+                <a:ext uri="{FF2B5EF4-FFF2-40B4-BE49-F238E27FC236}">
+                  <a16:creationId xmlns:a16="http://schemas.microsoft.com/office/drawing/2014/main" id="{137A21B9-F028-4105-AD87-B50563C3C8E7}"/>
+                </a:ext>
+              </a:extLst>
+            </p:cNvPr>
+            <p:cNvCxnSpPr>
+              <a:cxnSpLocks/>
+              <a:stCxn id="83" idx="0"/>
+            </p:cNvCxnSpPr>
+            <p:nvPr/>
+          </p:nvCxnSpPr>
+          <p:spPr>
+            <a:xfrm flipH="1" flipV="1">
+              <a:off x="13840737" y="7642648"/>
+              <a:ext cx="1143192" cy="720000"/>
+            </a:xfrm>
+            <a:prstGeom prst="straightConnector1">
+              <a:avLst/>
+            </a:prstGeom>
+            <a:ln w="76200">
+              <a:solidFill>
+                <a:schemeClr val="tx2">
+                  <a:lumMod val="75000"/>
+                </a:schemeClr>
+              </a:solidFill>
+              <a:tailEnd type="triangle"/>
+            </a:ln>
+          </p:spPr>
+          <p:style>
+            <a:lnRef idx="1">
+              <a:schemeClr val="accent1"/>
+            </a:lnRef>
+            <a:fillRef idx="0">
+              <a:schemeClr val="accent1"/>
+            </a:fillRef>
+            <a:effectRef idx="0">
+              <a:schemeClr val="accent1"/>
+            </a:effectRef>
+            <a:fontRef idx="minor">
+              <a:schemeClr val="tx1"/>
+            </a:fontRef>
+          </p:style>
+        </p:cxnSp>
+        <p:sp>
+          <p:nvSpPr>
+            <p:cNvPr id="83" name="ZoneTexte 82">
+              <a:extLst>
+                <a:ext uri="{FF2B5EF4-FFF2-40B4-BE49-F238E27FC236}">
+                  <a16:creationId xmlns:a16="http://schemas.microsoft.com/office/drawing/2014/main" id="{981D1829-8E3B-43F6-944F-57501984584C}"/>
+                </a:ext>
+              </a:extLst>
+            </p:cNvPr>
+            <p:cNvSpPr txBox="1"/>
+            <p:nvPr/>
+          </p:nvSpPr>
+          <p:spPr>
+            <a:xfrm>
+              <a:off x="13708580" y="8362648"/>
+              <a:ext cx="2550698" cy="523220"/>
+            </a:xfrm>
+            <a:prstGeom prst="rect">
+              <a:avLst/>
+            </a:prstGeom>
+            <a:noFill/>
+            <a:ln>
+              <a:solidFill>
+                <a:schemeClr val="tx1">
+                  <a:lumMod val="85000"/>
+                  <a:lumOff val="15000"/>
+                </a:schemeClr>
+              </a:solidFill>
+            </a:ln>
           </p:spPr>
           <p:txBody>
             <a:bodyPr wrap="none" rtlCol="0">
@@ -3852,7 +4196,527 @@
             <a:lstStyle/>
             <a:p>
               <a:r>
-                <a:rPr lang="fr-FR" sz="1811" dirty="0">
+                <a:rPr lang="fr-FR" sz="2800" dirty="0" err="1">
+                  <a:solidFill>
+                    <a:schemeClr val="tx2">
+                      <a:lumMod val="75000"/>
+                    </a:schemeClr>
+                  </a:solidFill>
+                  <a:latin typeface="Consolas" panose="020B0609020204030204" pitchFamily="49" charset="0"/>
+                </a:rPr>
+                <a:t>num_digits</a:t>
+              </a:r>
+              <a:r>
+                <a:rPr lang="fr-FR" sz="2800" dirty="0">
+                  <a:solidFill>
+                    <a:schemeClr val="tx2">
+                      <a:lumMod val="75000"/>
+                    </a:schemeClr>
+                  </a:solidFill>
+                  <a:latin typeface="Consolas" panose="020B0609020204030204" pitchFamily="49" charset="0"/>
+                </a:rPr>
+                <a:t>=3</a:t>
+              </a:r>
+            </a:p>
+          </p:txBody>
+        </p:sp>
+      </p:grpSp>
+      <p:grpSp>
+        <p:nvGrpSpPr>
+          <p:cNvPr id="11" name="Groupe 10">
+            <a:extLst>
+              <a:ext uri="{FF2B5EF4-FFF2-40B4-BE49-F238E27FC236}">
+                <a16:creationId xmlns:a16="http://schemas.microsoft.com/office/drawing/2014/main" id="{B3E5EE35-98ED-48CE-84B3-A8379DAF63F7}"/>
+              </a:ext>
+            </a:extLst>
+          </p:cNvPr>
+          <p:cNvGrpSpPr/>
+          <p:nvPr/>
+        </p:nvGrpSpPr>
+        <p:grpSpPr>
+          <a:xfrm>
+            <a:off x="6114809" y="7869837"/>
+            <a:ext cx="6253144" cy="1290845"/>
+            <a:chOff x="6975201" y="7581936"/>
+            <a:chExt cx="2905436" cy="1094381"/>
+          </a:xfrm>
+        </p:grpSpPr>
+        <p:sp>
+          <p:nvSpPr>
+            <p:cNvPr id="80" name="ZoneTexte 79">
+              <a:extLst>
+                <a:ext uri="{FF2B5EF4-FFF2-40B4-BE49-F238E27FC236}">
+                  <a16:creationId xmlns:a16="http://schemas.microsoft.com/office/drawing/2014/main" id="{A43051B7-B91D-4181-84BB-81D880B31CB0}"/>
+                </a:ext>
+              </a:extLst>
+            </p:cNvPr>
+            <p:cNvSpPr txBox="1"/>
+            <p:nvPr/>
+          </p:nvSpPr>
+          <p:spPr>
+            <a:xfrm>
+              <a:off x="6975201" y="8232730"/>
+              <a:ext cx="2905436" cy="443587"/>
+            </a:xfrm>
+            <a:prstGeom prst="rect">
+              <a:avLst/>
+            </a:prstGeom>
+            <a:noFill/>
+            <a:ln>
+              <a:solidFill>
+                <a:schemeClr val="tx1">
+                  <a:lumMod val="85000"/>
+                  <a:lumOff val="15000"/>
+                </a:schemeClr>
+              </a:solidFill>
+            </a:ln>
+          </p:spPr>
+          <p:txBody>
+            <a:bodyPr wrap="square" rtlCol="0" anchor="ctr">
+              <a:spAutoFit/>
+            </a:bodyPr>
+            <a:lstStyle/>
+            <a:p>
+              <a:r>
+                <a:rPr lang="fr-FR" sz="2800" dirty="0" err="1">
+                  <a:solidFill>
+                    <a:schemeClr val="tx2">
+                      <a:lumMod val="75000"/>
+                    </a:schemeClr>
+                  </a:solidFill>
+                  <a:latin typeface="Consolas" panose="020B0609020204030204" pitchFamily="49" charset="0"/>
+                </a:rPr>
+                <a:t>funs_arg</a:t>
+              </a:r>
+              <a:r>
+                <a:rPr lang="fr-FR" sz="2800" dirty="0">
+                  <a:solidFill>
+                    <a:schemeClr val="tx2">
+                      <a:lumMod val="75000"/>
+                    </a:schemeClr>
+                  </a:solidFill>
+                  <a:latin typeface="Consolas" panose="020B0609020204030204" pitchFamily="49" charset="0"/>
+                </a:rPr>
+                <a:t>=</a:t>
+              </a:r>
+              <a:r>
+                <a:rPr lang="fr-FR" sz="2800" dirty="0" err="1">
+                  <a:solidFill>
+                    <a:schemeClr val="tx2">
+                      <a:lumMod val="75000"/>
+                    </a:schemeClr>
+                  </a:solidFill>
+                  <a:latin typeface="Consolas" panose="020B0609020204030204" pitchFamily="49" charset="0"/>
+                </a:rPr>
+                <a:t>list</a:t>
+              </a:r>
+              <a:r>
+                <a:rPr lang="fr-FR" sz="2800" dirty="0">
+                  <a:solidFill>
+                    <a:schemeClr val="tx2">
+                      <a:lumMod val="75000"/>
+                    </a:schemeClr>
+                  </a:solidFill>
+                  <a:latin typeface="Consolas" panose="020B0609020204030204" pitchFamily="49" charset="0"/>
+                </a:rPr>
+                <a:t>(</a:t>
+              </a:r>
+              <a:r>
+                <a:rPr lang="fr-FR" sz="2800" dirty="0" err="1">
+                  <a:solidFill>
+                    <a:schemeClr val="tx2">
+                      <a:lumMod val="75000"/>
+                    </a:schemeClr>
+                  </a:solidFill>
+                  <a:latin typeface="Consolas" panose="020B0609020204030204" pitchFamily="49" charset="0"/>
+                </a:rPr>
+                <a:t>probs</a:t>
+              </a:r>
+              <a:r>
+                <a:rPr lang="fr-FR" sz="2800" dirty="0">
+                  <a:solidFill>
+                    <a:schemeClr val="tx2">
+                      <a:lumMod val="75000"/>
+                    </a:schemeClr>
+                  </a:solidFill>
+                  <a:latin typeface="Consolas" panose="020B0609020204030204" pitchFamily="49" charset="0"/>
+                </a:rPr>
+                <a:t>=c(.25,.75))</a:t>
+              </a:r>
+            </a:p>
+          </p:txBody>
+        </p:sp>
+        <p:cxnSp>
+          <p:nvCxnSpPr>
+            <p:cNvPr id="86" name="Connecteur droit avec flèche 85">
+              <a:extLst>
+                <a:ext uri="{FF2B5EF4-FFF2-40B4-BE49-F238E27FC236}">
+                  <a16:creationId xmlns:a16="http://schemas.microsoft.com/office/drawing/2014/main" id="{427C0EF6-446D-4C3E-9D46-BB81690FB611}"/>
+                </a:ext>
+              </a:extLst>
+            </p:cNvPr>
+            <p:cNvCxnSpPr>
+              <a:cxnSpLocks/>
+            </p:cNvCxnSpPr>
+            <p:nvPr/>
+          </p:nvCxnSpPr>
+          <p:spPr>
+            <a:xfrm flipH="1" flipV="1">
+              <a:off x="7249534" y="7581936"/>
+              <a:ext cx="388235" cy="647265"/>
+            </a:xfrm>
+            <a:prstGeom prst="straightConnector1">
+              <a:avLst/>
+            </a:prstGeom>
+            <a:ln w="76200">
+              <a:solidFill>
+                <a:schemeClr val="tx2">
+                  <a:lumMod val="75000"/>
+                </a:schemeClr>
+              </a:solidFill>
+              <a:tailEnd type="triangle"/>
+            </a:ln>
+          </p:spPr>
+          <p:style>
+            <a:lnRef idx="1">
+              <a:schemeClr val="accent1"/>
+            </a:lnRef>
+            <a:fillRef idx="0">
+              <a:schemeClr val="accent1"/>
+            </a:fillRef>
+            <a:effectRef idx="0">
+              <a:schemeClr val="accent1"/>
+            </a:effectRef>
+            <a:fontRef idx="minor">
+              <a:schemeClr val="tx1"/>
+            </a:fontRef>
+          </p:style>
+        </p:cxnSp>
+      </p:grpSp>
+      <p:grpSp>
+        <p:nvGrpSpPr>
+          <p:cNvPr id="32" name="Groupe 31">
+            <a:extLst>
+              <a:ext uri="{FF2B5EF4-FFF2-40B4-BE49-F238E27FC236}">
+                <a16:creationId xmlns:a16="http://schemas.microsoft.com/office/drawing/2014/main" id="{91962DCC-EE79-4CEA-AEFA-C1C9890215A8}"/>
+              </a:ext>
+            </a:extLst>
+          </p:cNvPr>
+          <p:cNvGrpSpPr/>
+          <p:nvPr/>
+        </p:nvGrpSpPr>
+        <p:grpSpPr>
+          <a:xfrm>
+            <a:off x="15555952" y="407801"/>
+            <a:ext cx="4241533" cy="1122217"/>
+            <a:chOff x="1613835" y="1696287"/>
+            <a:chExt cx="2382518" cy="1122217"/>
+          </a:xfrm>
+        </p:grpSpPr>
+        <p:cxnSp>
+          <p:nvCxnSpPr>
+            <p:cNvPr id="33" name="Connecteur droit avec flèche 32">
+              <a:extLst>
+                <a:ext uri="{FF2B5EF4-FFF2-40B4-BE49-F238E27FC236}">
+                  <a16:creationId xmlns:a16="http://schemas.microsoft.com/office/drawing/2014/main" id="{B3CBD0BD-884E-4756-99AE-EFF8F78BFDF9}"/>
+                </a:ext>
+              </a:extLst>
+            </p:cNvPr>
+            <p:cNvCxnSpPr>
+              <a:cxnSpLocks/>
+            </p:cNvCxnSpPr>
+            <p:nvPr/>
+          </p:nvCxnSpPr>
+          <p:spPr>
+            <a:xfrm>
+              <a:off x="3592310" y="2103894"/>
+              <a:ext cx="404043" cy="714610"/>
+            </a:xfrm>
+            <a:prstGeom prst="straightConnector1">
+              <a:avLst/>
+            </a:prstGeom>
+            <a:ln w="76200">
+              <a:solidFill>
+                <a:srgbClr val="333F50"/>
+              </a:solidFill>
+              <a:tailEnd type="triangle"/>
+            </a:ln>
+          </p:spPr>
+          <p:style>
+            <a:lnRef idx="1">
+              <a:schemeClr val="accent1"/>
+            </a:lnRef>
+            <a:fillRef idx="0">
+              <a:schemeClr val="accent1"/>
+            </a:fillRef>
+            <a:effectRef idx="0">
+              <a:schemeClr val="accent1"/>
+            </a:effectRef>
+            <a:fontRef idx="minor">
+              <a:schemeClr val="tx1"/>
+            </a:fontRef>
+          </p:style>
+        </p:cxnSp>
+        <p:sp>
+          <p:nvSpPr>
+            <p:cNvPr id="34" name="ZoneTexte 33">
+              <a:extLst>
+                <a:ext uri="{FF2B5EF4-FFF2-40B4-BE49-F238E27FC236}">
+                  <a16:creationId xmlns:a16="http://schemas.microsoft.com/office/drawing/2014/main" id="{2B9DE623-8956-42FC-9C65-92E6AB90A9EF}"/>
+                </a:ext>
+              </a:extLst>
+            </p:cNvPr>
+            <p:cNvSpPr txBox="1"/>
+            <p:nvPr/>
+          </p:nvSpPr>
+          <p:spPr>
+            <a:xfrm>
+              <a:off x="1613835" y="1696287"/>
+              <a:ext cx="1978475" cy="830997"/>
+            </a:xfrm>
+            <a:prstGeom prst="rect">
+              <a:avLst/>
+            </a:prstGeom>
+            <a:noFill/>
+            <a:ln>
+              <a:solidFill>
+                <a:schemeClr val="tx1">
+                  <a:lumMod val="85000"/>
+                  <a:lumOff val="15000"/>
+                </a:schemeClr>
+              </a:solidFill>
+            </a:ln>
+          </p:spPr>
+          <p:txBody>
+            <a:bodyPr wrap="square" rtlCol="0">
+              <a:spAutoFit/>
+            </a:bodyPr>
+            <a:lstStyle/>
+            <a:p>
+              <a:r>
+                <a:rPr lang="fr-FR" sz="2800" dirty="0" err="1">
+                  <a:solidFill>
+                    <a:schemeClr val="tx2">
+                      <a:lumMod val="75000"/>
+                    </a:schemeClr>
+                  </a:solidFill>
+                  <a:latin typeface="Consolas" panose="020B0609020204030204" pitchFamily="49" charset="0"/>
+                </a:rPr>
+                <a:t>header_show_n</a:t>
+              </a:r>
+              <a:r>
+                <a:rPr lang="fr-FR" sz="2800" dirty="0">
+                  <a:solidFill>
+                    <a:schemeClr val="tx2">
+                      <a:lumMod val="75000"/>
+                    </a:schemeClr>
+                  </a:solidFill>
+                  <a:latin typeface="Consolas" panose="020B0609020204030204" pitchFamily="49" charset="0"/>
+                </a:rPr>
+                <a:t>=1:2</a:t>
+              </a:r>
+            </a:p>
+            <a:p>
+              <a:r>
+                <a:rPr lang="fr-FR" sz="2000" dirty="0">
+                  <a:solidFill>
+                    <a:schemeClr val="tx2">
+                      <a:lumMod val="75000"/>
+                    </a:schemeClr>
+                  </a:solidFill>
+                </a:rPr>
+                <a:t>Shows the group size</a:t>
+              </a:r>
+            </a:p>
+          </p:txBody>
+        </p:sp>
+      </p:grpSp>
+      <p:grpSp>
+        <p:nvGrpSpPr>
+          <p:cNvPr id="4" name="Groupe 3">
+            <a:extLst>
+              <a:ext uri="{FF2B5EF4-FFF2-40B4-BE49-F238E27FC236}">
+                <a16:creationId xmlns:a16="http://schemas.microsoft.com/office/drawing/2014/main" id="{F9DA2684-EBA4-4B75-A9F5-F6918BE06958}"/>
+              </a:ext>
+            </a:extLst>
+          </p:cNvPr>
+          <p:cNvGrpSpPr/>
+          <p:nvPr/>
+        </p:nvGrpSpPr>
+        <p:grpSpPr>
+          <a:xfrm>
+            <a:off x="241854" y="5986605"/>
+            <a:ext cx="3339377" cy="771804"/>
+            <a:chOff x="1430874" y="4661702"/>
+            <a:chExt cx="3339377" cy="771804"/>
+          </a:xfrm>
+        </p:grpSpPr>
+        <p:sp>
+          <p:nvSpPr>
+            <p:cNvPr id="69" name="ZoneTexte 68">
+              <a:extLst>
+                <a:ext uri="{FF2B5EF4-FFF2-40B4-BE49-F238E27FC236}">
+                  <a16:creationId xmlns:a16="http://schemas.microsoft.com/office/drawing/2014/main" id="{FD1787FA-F67F-44DE-BE25-09FB1651D1A2}"/>
+                </a:ext>
+              </a:extLst>
+            </p:cNvPr>
+            <p:cNvSpPr txBox="1"/>
+            <p:nvPr/>
+          </p:nvSpPr>
+          <p:spPr>
+            <a:xfrm>
+              <a:off x="1430874" y="4910286"/>
+              <a:ext cx="3142207" cy="523220"/>
+            </a:xfrm>
+            <a:prstGeom prst="rect">
+              <a:avLst/>
+            </a:prstGeom>
+            <a:noFill/>
+            <a:ln>
+              <a:solidFill>
+                <a:schemeClr val="tx1">
+                  <a:lumMod val="85000"/>
+                  <a:lumOff val="15000"/>
+                </a:schemeClr>
+              </a:solidFill>
+            </a:ln>
+          </p:spPr>
+          <p:txBody>
+            <a:bodyPr wrap="none" rtlCol="0" anchor="ctr">
+              <a:spAutoFit/>
+            </a:bodyPr>
+            <a:lstStyle/>
+            <a:p>
+              <a:r>
+                <a:rPr lang="fr-FR" sz="2800" dirty="0" err="1">
+                  <a:solidFill>
+                    <a:schemeClr val="tx2">
+                      <a:lumMod val="75000"/>
+                    </a:schemeClr>
+                  </a:solidFill>
+                  <a:latin typeface="Consolas" panose="020B0609020204030204" pitchFamily="49" charset="0"/>
+                </a:rPr>
+                <a:t>ends_with</a:t>
+              </a:r>
+              <a:r>
+                <a:rPr lang="fr-FR" sz="2800" dirty="0">
+                  <a:solidFill>
+                    <a:schemeClr val="tx2">
+                      <a:lumMod val="75000"/>
+                    </a:schemeClr>
+                  </a:solidFill>
+                  <a:latin typeface="Consolas" panose="020B0609020204030204" pitchFamily="49" charset="0"/>
+                </a:rPr>
+                <a:t>("at")</a:t>
+              </a:r>
+            </a:p>
+          </p:txBody>
+        </p:sp>
+        <p:cxnSp>
+          <p:nvCxnSpPr>
+            <p:cNvPr id="29" name="Connecteur droit avec flèche 28">
+              <a:extLst>
+                <a:ext uri="{FF2B5EF4-FFF2-40B4-BE49-F238E27FC236}">
+                  <a16:creationId xmlns:a16="http://schemas.microsoft.com/office/drawing/2014/main" id="{17606CD9-97DB-4DE2-9045-256616644B32}"/>
+                </a:ext>
+              </a:extLst>
+            </p:cNvPr>
+            <p:cNvCxnSpPr>
+              <a:cxnSpLocks/>
+            </p:cNvCxnSpPr>
+            <p:nvPr/>
+          </p:nvCxnSpPr>
+          <p:spPr>
+            <a:xfrm flipV="1">
+              <a:off x="4065399" y="4661702"/>
+              <a:ext cx="704852" cy="204383"/>
+            </a:xfrm>
+            <a:prstGeom prst="straightConnector1">
+              <a:avLst/>
+            </a:prstGeom>
+            <a:ln w="76200">
+              <a:solidFill>
+                <a:schemeClr val="tx2">
+                  <a:lumMod val="75000"/>
+                </a:schemeClr>
+              </a:solidFill>
+              <a:tailEnd type="triangle"/>
+            </a:ln>
+          </p:spPr>
+          <p:style>
+            <a:lnRef idx="1">
+              <a:schemeClr val="accent1"/>
+            </a:lnRef>
+            <a:fillRef idx="0">
+              <a:schemeClr val="accent1"/>
+            </a:fillRef>
+            <a:effectRef idx="0">
+              <a:schemeClr val="accent1"/>
+            </a:effectRef>
+            <a:fontRef idx="minor">
+              <a:schemeClr val="tx1"/>
+            </a:fontRef>
+          </p:style>
+        </p:cxnSp>
+      </p:grpSp>
+      <p:grpSp>
+        <p:nvGrpSpPr>
+          <p:cNvPr id="24" name="Groupe 23">
+            <a:extLst>
+              <a:ext uri="{FF2B5EF4-FFF2-40B4-BE49-F238E27FC236}">
+                <a16:creationId xmlns:a16="http://schemas.microsoft.com/office/drawing/2014/main" id="{7E578BAE-4490-484D-A5FB-7AB1806B85F9}"/>
+              </a:ext>
+            </a:extLst>
+          </p:cNvPr>
+          <p:cNvGrpSpPr/>
+          <p:nvPr/>
+        </p:nvGrpSpPr>
+        <p:grpSpPr>
+          <a:xfrm>
+            <a:off x="585915" y="1530018"/>
+            <a:ext cx="2885461" cy="1196495"/>
+            <a:chOff x="585915" y="2038018"/>
+            <a:chExt cx="2885461" cy="1196495"/>
+          </a:xfrm>
+        </p:grpSpPr>
+        <p:sp>
+          <p:nvSpPr>
+            <p:cNvPr id="36" name="ZoneTexte 35">
+              <a:extLst>
+                <a:ext uri="{FF2B5EF4-FFF2-40B4-BE49-F238E27FC236}">
+                  <a16:creationId xmlns:a16="http://schemas.microsoft.com/office/drawing/2014/main" id="{F483E4C5-C611-4CCE-9677-CD2B1C412436}"/>
+                </a:ext>
+              </a:extLst>
+            </p:cNvPr>
+            <p:cNvSpPr txBox="1"/>
+            <p:nvPr/>
+          </p:nvSpPr>
+          <p:spPr>
+            <a:xfrm>
+              <a:off x="585915" y="2354765"/>
+              <a:ext cx="2550698" cy="523220"/>
+            </a:xfrm>
+            <a:prstGeom prst="rect">
+              <a:avLst/>
+            </a:prstGeom>
+            <a:noFill/>
+            <a:ln>
+              <a:solidFill>
+                <a:schemeClr val="tx1">
+                  <a:lumMod val="85000"/>
+                  <a:lumOff val="15000"/>
+                </a:schemeClr>
+              </a:solidFill>
+            </a:ln>
+          </p:spPr>
+          <p:txBody>
+            <a:bodyPr wrap="none" rtlCol="0" anchor="ctr">
+              <a:spAutoFit/>
+            </a:bodyPr>
+            <a:lstStyle/>
+            <a:p>
+              <a:r>
+                <a:rPr lang="fr-FR" sz="2800" dirty="0">
                   <a:solidFill>
                     <a:schemeClr val="tx2">
                       <a:lumMod val="75000"/>
@@ -3863,7 +4727,7 @@
                 <a:t>by=c(</a:t>
               </a:r>
               <a:r>
-                <a:rPr lang="fr-FR" sz="1811" dirty="0" err="1">
+                <a:rPr lang="fr-FR" sz="2800" dirty="0" err="1">
                   <a:solidFill>
                     <a:schemeClr val="tx2">
                       <a:lumMod val="75000"/>
@@ -3874,7 +4738,7 @@
                 <a:t>am</a:t>
               </a:r>
               <a:r>
-                <a:rPr lang="fr-FR" sz="1811" dirty="0">
+                <a:rPr lang="fr-FR" sz="2800" dirty="0">
                   <a:solidFill>
                     <a:schemeClr val="tx2">
                       <a:lumMod val="75000"/>
@@ -3889,10 +4753,10 @@
         </p:sp>
         <p:sp>
           <p:nvSpPr>
-            <p:cNvPr id="26" name="Accolade fermante 25">
+            <p:cNvPr id="38" name="Accolade fermante 37">
               <a:extLst>
                 <a:ext uri="{FF2B5EF4-FFF2-40B4-BE49-F238E27FC236}">
-                  <a16:creationId xmlns:a16="http://schemas.microsoft.com/office/drawing/2014/main" id="{29F0DB79-881E-4695-8C2C-FDCD6587EDEC}"/>
+                  <a16:creationId xmlns:a16="http://schemas.microsoft.com/office/drawing/2014/main" id="{3AA4C03E-1D78-4E1F-8022-230C697916C4}"/>
                 </a:ext>
               </a:extLst>
             </p:cNvPr>
@@ -3900,9 +4764,9 @@
             <p:nvPr/>
           </p:nvSpPr>
           <p:spPr>
-            <a:xfrm>
-              <a:off x="18797954" y="523221"/>
-              <a:ext cx="351692" cy="1336431"/>
+            <a:xfrm flipH="1">
+              <a:off x="3239271" y="2038018"/>
+              <a:ext cx="232105" cy="1196495"/>
             </a:xfrm>
             <a:prstGeom prst="rightBrace">
               <a:avLst/>
@@ -3937,790 +4801,6 @@
           </p:txBody>
         </p:sp>
       </p:grpSp>
-      <p:sp>
-        <p:nvSpPr>
-          <p:cNvPr id="52" name="ZoneTexte 51">
-            <a:extLst>
-              <a:ext uri="{FF2B5EF4-FFF2-40B4-BE49-F238E27FC236}">
-                <a16:creationId xmlns:a16="http://schemas.microsoft.com/office/drawing/2014/main" id="{9DED810E-C537-4E8E-8020-6D240AE284E7}"/>
-              </a:ext>
-            </a:extLst>
-          </p:cNvPr>
-          <p:cNvSpPr txBox="1"/>
-          <p:nvPr/>
-        </p:nvSpPr>
-        <p:spPr>
-          <a:xfrm>
-            <a:off x="1925798" y="3275225"/>
-            <a:ext cx="2364750" cy="370999"/>
-          </a:xfrm>
-          <a:prstGeom prst="rect">
-            <a:avLst/>
-          </a:prstGeom>
-          <a:noFill/>
-          <a:ln>
-            <a:solidFill>
-              <a:schemeClr val="tx1">
-                <a:lumMod val="85000"/>
-                <a:lumOff val="15000"/>
-              </a:schemeClr>
-            </a:solidFill>
-          </a:ln>
-        </p:spPr>
-        <p:txBody>
-          <a:bodyPr wrap="none" rtlCol="0" anchor="ctr">
-            <a:spAutoFit/>
-          </a:bodyPr>
-          <a:lstStyle/>
-          <a:p>
-            <a:r>
-              <a:rPr lang="fr-FR" dirty="0" err="1">
-                <a:solidFill>
-                  <a:schemeClr val="tx2">
-                    <a:lumMod val="75000"/>
-                  </a:schemeClr>
-                </a:solidFill>
-                <a:latin typeface="Consolas" panose="020B0609020204030204" pitchFamily="49" charset="0"/>
-              </a:rPr>
-              <a:t>starts_with</a:t>
-            </a:r>
-            <a:r>
-              <a:rPr lang="fr-FR" dirty="0">
-                <a:solidFill>
-                  <a:schemeClr val="tx2">
-                    <a:lumMod val="75000"/>
-                  </a:schemeClr>
-                </a:solidFill>
-                <a:latin typeface="Consolas" panose="020B0609020204030204" pitchFamily="49" charset="0"/>
-              </a:rPr>
-              <a:t>("</a:t>
-            </a:r>
-            <a:r>
-              <a:rPr lang="fr-FR" dirty="0" err="1">
-                <a:solidFill>
-                  <a:schemeClr val="tx2">
-                    <a:lumMod val="75000"/>
-                  </a:schemeClr>
-                </a:solidFill>
-                <a:latin typeface="Consolas" panose="020B0609020204030204" pitchFamily="49" charset="0"/>
-              </a:rPr>
-              <a:t>cy</a:t>
-            </a:r>
-            <a:r>
-              <a:rPr lang="fr-FR" dirty="0">
-                <a:solidFill>
-                  <a:schemeClr val="tx2">
-                    <a:lumMod val="75000"/>
-                  </a:schemeClr>
-                </a:solidFill>
-                <a:latin typeface="Consolas" panose="020B0609020204030204" pitchFamily="49" charset="0"/>
-              </a:rPr>
-              <a:t>")</a:t>
-            </a:r>
-          </a:p>
-        </p:txBody>
-      </p:sp>
-      <p:cxnSp>
-        <p:nvCxnSpPr>
-          <p:cNvPr id="56" name="Connecteur droit avec flèche 55">
-            <a:extLst>
-              <a:ext uri="{FF2B5EF4-FFF2-40B4-BE49-F238E27FC236}">
-                <a16:creationId xmlns:a16="http://schemas.microsoft.com/office/drawing/2014/main" id="{6D0132BF-F57A-4B09-9A4B-28E309A5F215}"/>
-              </a:ext>
-            </a:extLst>
-          </p:cNvPr>
-          <p:cNvCxnSpPr>
-            <a:cxnSpLocks/>
-            <a:stCxn id="52" idx="3"/>
-          </p:cNvCxnSpPr>
-          <p:nvPr/>
-        </p:nvCxnSpPr>
-        <p:spPr>
-          <a:xfrm>
-            <a:off x="4290548" y="3460724"/>
-            <a:ext cx="720000" cy="0"/>
-          </a:xfrm>
-          <a:prstGeom prst="straightConnector1">
-            <a:avLst/>
-          </a:prstGeom>
-          <a:ln w="76200">
-            <a:solidFill>
-              <a:schemeClr val="tx2">
-                <a:lumMod val="75000"/>
-              </a:schemeClr>
-            </a:solidFill>
-            <a:tailEnd type="triangle"/>
-          </a:ln>
-        </p:spPr>
-        <p:style>
-          <a:lnRef idx="1">
-            <a:schemeClr val="accent1"/>
-          </a:lnRef>
-          <a:fillRef idx="0">
-            <a:schemeClr val="accent1"/>
-          </a:fillRef>
-          <a:effectRef idx="0">
-            <a:schemeClr val="accent1"/>
-          </a:effectRef>
-          <a:fontRef idx="minor">
-            <a:schemeClr val="tx1"/>
-          </a:fontRef>
-        </p:style>
-      </p:cxnSp>
-      <p:sp>
-        <p:nvSpPr>
-          <p:cNvPr id="69" name="ZoneTexte 68">
-            <a:extLst>
-              <a:ext uri="{FF2B5EF4-FFF2-40B4-BE49-F238E27FC236}">
-                <a16:creationId xmlns:a16="http://schemas.microsoft.com/office/drawing/2014/main" id="{FD1787FA-F67F-44DE-BE25-09FB1651D1A2}"/>
-              </a:ext>
-            </a:extLst>
-          </p:cNvPr>
-          <p:cNvSpPr txBox="1"/>
-          <p:nvPr/>
-        </p:nvSpPr>
-        <p:spPr>
-          <a:xfrm>
-            <a:off x="2187184" y="5699091"/>
-            <a:ext cx="2108269" cy="370999"/>
-          </a:xfrm>
-          <a:prstGeom prst="rect">
-            <a:avLst/>
-          </a:prstGeom>
-          <a:noFill/>
-          <a:ln>
-            <a:solidFill>
-              <a:schemeClr val="tx1">
-                <a:lumMod val="85000"/>
-                <a:lumOff val="15000"/>
-              </a:schemeClr>
-            </a:solidFill>
-          </a:ln>
-        </p:spPr>
-        <p:txBody>
-          <a:bodyPr wrap="none" rtlCol="0" anchor="ctr">
-            <a:spAutoFit/>
-          </a:bodyPr>
-          <a:lstStyle/>
-          <a:p>
-            <a:r>
-              <a:rPr lang="fr-FR" dirty="0" err="1">
-                <a:solidFill>
-                  <a:schemeClr val="tx2">
-                    <a:lumMod val="75000"/>
-                  </a:schemeClr>
-                </a:solidFill>
-                <a:latin typeface="Consolas" panose="020B0609020204030204" pitchFamily="49" charset="0"/>
-              </a:rPr>
-              <a:t>ends_with</a:t>
-            </a:r>
-            <a:r>
-              <a:rPr lang="fr-FR" dirty="0">
-                <a:solidFill>
-                  <a:schemeClr val="tx2">
-                    <a:lumMod val="75000"/>
-                  </a:schemeClr>
-                </a:solidFill>
-                <a:latin typeface="Consolas" panose="020B0609020204030204" pitchFamily="49" charset="0"/>
-              </a:rPr>
-              <a:t>("at")</a:t>
-            </a:r>
-          </a:p>
-        </p:txBody>
-      </p:sp>
-      <p:cxnSp>
-        <p:nvCxnSpPr>
-          <p:cNvPr id="71" name="Connecteur droit avec flèche 70">
-            <a:extLst>
-              <a:ext uri="{FF2B5EF4-FFF2-40B4-BE49-F238E27FC236}">
-                <a16:creationId xmlns:a16="http://schemas.microsoft.com/office/drawing/2014/main" id="{3F8CC7EF-EE85-40FD-94CA-573DEAD8F003}"/>
-              </a:ext>
-            </a:extLst>
-          </p:cNvPr>
-          <p:cNvCxnSpPr>
-            <a:cxnSpLocks/>
-            <a:stCxn id="69" idx="3"/>
-          </p:cNvCxnSpPr>
-          <p:nvPr/>
-        </p:nvCxnSpPr>
-        <p:spPr>
-          <a:xfrm>
-            <a:off x="4295452" y="5884590"/>
-            <a:ext cx="720000" cy="0"/>
-          </a:xfrm>
-          <a:prstGeom prst="straightConnector1">
-            <a:avLst/>
-          </a:prstGeom>
-          <a:ln w="76200">
-            <a:solidFill>
-              <a:schemeClr val="tx2">
-                <a:lumMod val="75000"/>
-              </a:schemeClr>
-            </a:solidFill>
-            <a:tailEnd type="triangle"/>
-          </a:ln>
-        </p:spPr>
-        <p:style>
-          <a:lnRef idx="1">
-            <a:schemeClr val="accent1"/>
-          </a:lnRef>
-          <a:fillRef idx="0">
-            <a:schemeClr val="accent1"/>
-          </a:fillRef>
-          <a:effectRef idx="0">
-            <a:schemeClr val="accent1"/>
-          </a:effectRef>
-          <a:fontRef idx="minor">
-            <a:schemeClr val="tx1"/>
-          </a:fontRef>
-        </p:style>
-      </p:cxnSp>
-      <p:cxnSp>
-        <p:nvCxnSpPr>
-          <p:cNvPr id="74" name="Connecteur droit avec flèche 73">
-            <a:extLst>
-              <a:ext uri="{FF2B5EF4-FFF2-40B4-BE49-F238E27FC236}">
-                <a16:creationId xmlns:a16="http://schemas.microsoft.com/office/drawing/2014/main" id="{C3E57012-5267-4CD3-A4E7-4BCD1A4B809D}"/>
-              </a:ext>
-            </a:extLst>
-          </p:cNvPr>
-          <p:cNvCxnSpPr>
-            <a:cxnSpLocks/>
-          </p:cNvCxnSpPr>
-          <p:nvPr/>
-        </p:nvCxnSpPr>
-        <p:spPr>
-          <a:xfrm>
-            <a:off x="6011017" y="1611232"/>
-            <a:ext cx="720000" cy="720000"/>
-          </a:xfrm>
-          <a:prstGeom prst="straightConnector1">
-            <a:avLst/>
-          </a:prstGeom>
-          <a:ln w="76200">
-            <a:solidFill>
-              <a:srgbClr val="333F50"/>
-            </a:solidFill>
-            <a:tailEnd type="triangle"/>
-          </a:ln>
-        </p:spPr>
-        <p:style>
-          <a:lnRef idx="1">
-            <a:schemeClr val="accent1"/>
-          </a:lnRef>
-          <a:fillRef idx="0">
-            <a:schemeClr val="accent1"/>
-          </a:fillRef>
-          <a:effectRef idx="0">
-            <a:schemeClr val="accent1"/>
-          </a:effectRef>
-          <a:fontRef idx="minor">
-            <a:schemeClr val="tx1"/>
-          </a:fontRef>
-        </p:style>
-      </p:cxnSp>
-      <p:sp>
-        <p:nvSpPr>
-          <p:cNvPr id="75" name="ZoneTexte 74">
-            <a:extLst>
-              <a:ext uri="{FF2B5EF4-FFF2-40B4-BE49-F238E27FC236}">
-                <a16:creationId xmlns:a16="http://schemas.microsoft.com/office/drawing/2014/main" id="{D2E33716-B1AC-4EB2-93E6-A4B912E40908}"/>
-              </a:ext>
-            </a:extLst>
-          </p:cNvPr>
-          <p:cNvSpPr txBox="1"/>
-          <p:nvPr/>
-        </p:nvSpPr>
-        <p:spPr>
-          <a:xfrm>
-            <a:off x="4295452" y="1045375"/>
-            <a:ext cx="2979890" cy="609847"/>
-          </a:xfrm>
-          <a:prstGeom prst="rect">
-            <a:avLst/>
-          </a:prstGeom>
-          <a:noFill/>
-          <a:ln>
-            <a:solidFill>
-              <a:schemeClr val="tx1">
-                <a:lumMod val="85000"/>
-                <a:lumOff val="15000"/>
-              </a:schemeClr>
-            </a:solidFill>
-          </a:ln>
-        </p:spPr>
-        <p:txBody>
-          <a:bodyPr wrap="square" rtlCol="0">
-            <a:spAutoFit/>
-          </a:bodyPr>
-          <a:lstStyle/>
-          <a:p>
-            <a:r>
-              <a:rPr lang="fr-FR" sz="1811" dirty="0">
-                <a:solidFill>
-                  <a:schemeClr val="tx2">
-                    <a:lumMod val="75000"/>
-                  </a:schemeClr>
-                </a:solidFill>
-                <a:latin typeface="Consolas" panose="020B0609020204030204" pitchFamily="49" charset="0"/>
-              </a:rPr>
-              <a:t>label=FALSE</a:t>
-            </a:r>
-          </a:p>
-          <a:p>
-            <a:r>
-              <a:rPr lang="fr-FR" sz="1552" dirty="0">
-                <a:solidFill>
-                  <a:schemeClr val="tx2">
-                    <a:lumMod val="75000"/>
-                  </a:schemeClr>
-                </a:solidFill>
-              </a:rPr>
-              <a:t>Variable </a:t>
-            </a:r>
-            <a:r>
-              <a:rPr lang="fr-FR" sz="1552" dirty="0" err="1">
-                <a:solidFill>
-                  <a:schemeClr val="tx2">
-                    <a:lumMod val="75000"/>
-                  </a:schemeClr>
-                </a:solidFill>
-              </a:rPr>
-              <a:t>name</a:t>
-            </a:r>
-            <a:r>
-              <a:rPr lang="fr-FR" sz="1552" dirty="0">
-                <a:solidFill>
-                  <a:schemeClr val="tx2">
-                    <a:lumMod val="75000"/>
-                  </a:schemeClr>
-                </a:solidFill>
-              </a:rPr>
-              <a:t> </a:t>
-            </a:r>
-            <a:r>
-              <a:rPr lang="fr-FR" sz="1552" dirty="0" err="1">
-                <a:solidFill>
-                  <a:schemeClr val="tx2">
-                    <a:lumMod val="75000"/>
-                  </a:schemeClr>
-                </a:solidFill>
-              </a:rPr>
-              <a:t>instead</a:t>
-            </a:r>
-            <a:r>
-              <a:rPr lang="fr-FR" sz="1552" dirty="0">
-                <a:solidFill>
-                  <a:schemeClr val="tx2">
-                    <a:lumMod val="75000"/>
-                  </a:schemeClr>
-                </a:solidFill>
-              </a:rPr>
-              <a:t> of label</a:t>
-            </a:r>
-          </a:p>
-        </p:txBody>
-      </p:sp>
-      <p:sp>
-        <p:nvSpPr>
-          <p:cNvPr id="77" name="ZoneTexte 76">
-            <a:extLst>
-              <a:ext uri="{FF2B5EF4-FFF2-40B4-BE49-F238E27FC236}">
-                <a16:creationId xmlns:a16="http://schemas.microsoft.com/office/drawing/2014/main" id="{08DF0282-5912-417D-86E7-BBD71B821EF9}"/>
-              </a:ext>
-            </a:extLst>
-          </p:cNvPr>
-          <p:cNvSpPr txBox="1"/>
-          <p:nvPr/>
-        </p:nvSpPr>
-        <p:spPr>
-          <a:xfrm>
-            <a:off x="1925799" y="6661983"/>
-            <a:ext cx="2970685" cy="369332"/>
-          </a:xfrm>
-          <a:prstGeom prst="rect">
-            <a:avLst/>
-          </a:prstGeom>
-          <a:noFill/>
-          <a:ln>
-            <a:solidFill>
-              <a:schemeClr val="tx1">
-                <a:lumMod val="85000"/>
-                <a:lumOff val="15000"/>
-              </a:schemeClr>
-            </a:solidFill>
-          </a:ln>
-        </p:spPr>
-        <p:txBody>
-          <a:bodyPr wrap="none" rtlCol="0" anchor="ctr">
-            <a:spAutoFit/>
-          </a:bodyPr>
-          <a:lstStyle/>
-          <a:p>
-            <a:r>
-              <a:rPr lang="fr-FR" dirty="0">
-                <a:solidFill>
-                  <a:schemeClr val="tx2">
-                    <a:lumMod val="75000"/>
-                  </a:schemeClr>
-                </a:solidFill>
-                <a:latin typeface="Consolas" panose="020B0609020204030204" pitchFamily="49" charset="0"/>
-              </a:rPr>
-              <a:t>funs=c(</a:t>
-            </a:r>
-            <a:r>
-              <a:rPr lang="fr-FR" dirty="0" err="1">
-                <a:solidFill>
-                  <a:schemeClr val="tx2">
-                    <a:lumMod val="75000"/>
-                  </a:schemeClr>
-                </a:solidFill>
-                <a:latin typeface="Consolas" panose="020B0609020204030204" pitchFamily="49" charset="0"/>
-              </a:rPr>
-              <a:t>mean</a:t>
-            </a:r>
-            <a:r>
-              <a:rPr lang="fr-FR" dirty="0">
-                <a:solidFill>
-                  <a:schemeClr val="tx2">
-                    <a:lumMod val="75000"/>
-                  </a:schemeClr>
-                </a:solidFill>
-                <a:latin typeface="Consolas" panose="020B0609020204030204" pitchFamily="49" charset="0"/>
-              </a:rPr>
-              <a:t>, quantile)</a:t>
-            </a:r>
-          </a:p>
-        </p:txBody>
-      </p:sp>
-      <p:cxnSp>
-        <p:nvCxnSpPr>
-          <p:cNvPr id="78" name="Connecteur droit avec flèche 77">
-            <a:extLst>
-              <a:ext uri="{FF2B5EF4-FFF2-40B4-BE49-F238E27FC236}">
-                <a16:creationId xmlns:a16="http://schemas.microsoft.com/office/drawing/2014/main" id="{013FD60E-4552-4928-B46E-7282B386C41A}"/>
-              </a:ext>
-            </a:extLst>
-          </p:cNvPr>
-          <p:cNvCxnSpPr>
-            <a:cxnSpLocks/>
-            <a:stCxn id="77" idx="3"/>
-          </p:cNvCxnSpPr>
-          <p:nvPr/>
-        </p:nvCxnSpPr>
-        <p:spPr>
-          <a:xfrm>
-            <a:off x="4896482" y="6846649"/>
-            <a:ext cx="720000" cy="0"/>
-          </a:xfrm>
-          <a:prstGeom prst="straightConnector1">
-            <a:avLst/>
-          </a:prstGeom>
-          <a:ln w="76200">
-            <a:solidFill>
-              <a:schemeClr val="tx2">
-                <a:lumMod val="75000"/>
-              </a:schemeClr>
-            </a:solidFill>
-            <a:tailEnd type="triangle"/>
-          </a:ln>
-        </p:spPr>
-        <p:style>
-          <a:lnRef idx="1">
-            <a:schemeClr val="accent1"/>
-          </a:lnRef>
-          <a:fillRef idx="0">
-            <a:schemeClr val="accent1"/>
-          </a:fillRef>
-          <a:effectRef idx="0">
-            <a:schemeClr val="accent1"/>
-          </a:effectRef>
-          <a:fontRef idx="minor">
-            <a:schemeClr val="tx1"/>
-          </a:fontRef>
-        </p:style>
-      </p:cxnSp>
-      <p:sp>
-        <p:nvSpPr>
-          <p:cNvPr id="80" name="ZoneTexte 79">
-            <a:extLst>
-              <a:ext uri="{FF2B5EF4-FFF2-40B4-BE49-F238E27FC236}">
-                <a16:creationId xmlns:a16="http://schemas.microsoft.com/office/drawing/2014/main" id="{A43051B7-B91D-4181-84BB-81D880B31CB0}"/>
-              </a:ext>
-            </a:extLst>
-          </p:cNvPr>
-          <p:cNvSpPr txBox="1"/>
-          <p:nvPr/>
-        </p:nvSpPr>
-        <p:spPr>
-          <a:xfrm>
-            <a:off x="6972301" y="8426115"/>
-            <a:ext cx="4081464" cy="369332"/>
-          </a:xfrm>
-          <a:prstGeom prst="rect">
-            <a:avLst/>
-          </a:prstGeom>
-          <a:noFill/>
-          <a:ln>
-            <a:solidFill>
-              <a:schemeClr val="tx1">
-                <a:lumMod val="85000"/>
-                <a:lumOff val="15000"/>
-              </a:schemeClr>
-            </a:solidFill>
-          </a:ln>
-        </p:spPr>
-        <p:txBody>
-          <a:bodyPr wrap="square" rtlCol="0" anchor="ctr">
-            <a:spAutoFit/>
-          </a:bodyPr>
-          <a:lstStyle/>
-          <a:p>
-            <a:r>
-              <a:rPr lang="fr-FR" dirty="0" err="1">
-                <a:solidFill>
-                  <a:schemeClr val="tx2">
-                    <a:lumMod val="75000"/>
-                  </a:schemeClr>
-                </a:solidFill>
-                <a:latin typeface="Consolas" panose="020B0609020204030204" pitchFamily="49" charset="0"/>
-              </a:rPr>
-              <a:t>funs_arg</a:t>
-            </a:r>
-            <a:r>
-              <a:rPr lang="fr-FR" dirty="0">
-                <a:solidFill>
-                  <a:schemeClr val="tx2">
-                    <a:lumMod val="75000"/>
-                  </a:schemeClr>
-                </a:solidFill>
-                <a:latin typeface="Consolas" panose="020B0609020204030204" pitchFamily="49" charset="0"/>
-              </a:rPr>
-              <a:t>=</a:t>
-            </a:r>
-            <a:r>
-              <a:rPr lang="fr-FR" dirty="0" err="1">
-                <a:solidFill>
-                  <a:schemeClr val="tx2">
-                    <a:lumMod val="75000"/>
-                  </a:schemeClr>
-                </a:solidFill>
-                <a:latin typeface="Consolas" panose="020B0609020204030204" pitchFamily="49" charset="0"/>
-              </a:rPr>
-              <a:t>list</a:t>
-            </a:r>
-            <a:r>
-              <a:rPr lang="fr-FR" dirty="0">
-                <a:solidFill>
-                  <a:schemeClr val="tx2">
-                    <a:lumMod val="75000"/>
-                  </a:schemeClr>
-                </a:solidFill>
-                <a:latin typeface="Consolas" panose="020B0609020204030204" pitchFamily="49" charset="0"/>
-              </a:rPr>
-              <a:t>(</a:t>
-            </a:r>
-            <a:r>
-              <a:rPr lang="fr-FR" dirty="0" err="1">
-                <a:solidFill>
-                  <a:schemeClr val="tx2">
-                    <a:lumMod val="75000"/>
-                  </a:schemeClr>
-                </a:solidFill>
-                <a:latin typeface="Consolas" panose="020B0609020204030204" pitchFamily="49" charset="0"/>
-              </a:rPr>
-              <a:t>probs</a:t>
-            </a:r>
-            <a:r>
-              <a:rPr lang="fr-FR" dirty="0">
-                <a:solidFill>
-                  <a:schemeClr val="tx2">
-                    <a:lumMod val="75000"/>
-                  </a:schemeClr>
-                </a:solidFill>
-                <a:latin typeface="Consolas" panose="020B0609020204030204" pitchFamily="49" charset="0"/>
-              </a:rPr>
-              <a:t>=c(.25,.75))</a:t>
-            </a:r>
-          </a:p>
-        </p:txBody>
-      </p:sp>
-      <p:cxnSp>
-        <p:nvCxnSpPr>
-          <p:cNvPr id="81" name="Connecteur droit avec flèche 80">
-            <a:extLst>
-              <a:ext uri="{FF2B5EF4-FFF2-40B4-BE49-F238E27FC236}">
-                <a16:creationId xmlns:a16="http://schemas.microsoft.com/office/drawing/2014/main" id="{137A21B9-F028-4105-AD87-B50563C3C8E7}"/>
-              </a:ext>
-            </a:extLst>
-          </p:cNvPr>
-          <p:cNvCxnSpPr>
-            <a:cxnSpLocks/>
-            <a:stCxn id="83" idx="0"/>
-          </p:cNvCxnSpPr>
-          <p:nvPr/>
-        </p:nvCxnSpPr>
-        <p:spPr>
-          <a:xfrm flipH="1" flipV="1">
-            <a:off x="13918213" y="7832051"/>
-            <a:ext cx="611627" cy="594064"/>
-          </a:xfrm>
-          <a:prstGeom prst="straightConnector1">
-            <a:avLst/>
-          </a:prstGeom>
-          <a:ln w="76200">
-            <a:solidFill>
-              <a:schemeClr val="tx2">
-                <a:lumMod val="75000"/>
-              </a:schemeClr>
-            </a:solidFill>
-            <a:tailEnd type="triangle"/>
-          </a:ln>
-        </p:spPr>
-        <p:style>
-          <a:lnRef idx="1">
-            <a:schemeClr val="accent1"/>
-          </a:lnRef>
-          <a:fillRef idx="0">
-            <a:schemeClr val="accent1"/>
-          </a:fillRef>
-          <a:effectRef idx="0">
-            <a:schemeClr val="accent1"/>
-          </a:effectRef>
-          <a:fontRef idx="minor">
-            <a:schemeClr val="tx1"/>
-          </a:fontRef>
-        </p:style>
-      </p:cxnSp>
-      <p:sp>
-        <p:nvSpPr>
-          <p:cNvPr id="83" name="ZoneTexte 82">
-            <a:extLst>
-              <a:ext uri="{FF2B5EF4-FFF2-40B4-BE49-F238E27FC236}">
-                <a16:creationId xmlns:a16="http://schemas.microsoft.com/office/drawing/2014/main" id="{981D1829-8E3B-43F6-944F-57501984584C}"/>
-              </a:ext>
-            </a:extLst>
-          </p:cNvPr>
-          <p:cNvSpPr txBox="1"/>
-          <p:nvPr/>
-        </p:nvSpPr>
-        <p:spPr>
-          <a:xfrm>
-            <a:off x="12981178" y="8426115"/>
-            <a:ext cx="3097323" cy="369332"/>
-          </a:xfrm>
-          <a:prstGeom prst="rect">
-            <a:avLst/>
-          </a:prstGeom>
-          <a:noFill/>
-          <a:ln>
-            <a:solidFill>
-              <a:schemeClr val="tx1">
-                <a:lumMod val="85000"/>
-                <a:lumOff val="15000"/>
-              </a:schemeClr>
-            </a:solidFill>
-          </a:ln>
-        </p:spPr>
-        <p:txBody>
-          <a:bodyPr wrap="none" rtlCol="0">
-            <a:spAutoFit/>
-          </a:bodyPr>
-          <a:lstStyle/>
-          <a:p>
-            <a:r>
-              <a:rPr lang="fr-FR" dirty="0" err="1">
-                <a:solidFill>
-                  <a:schemeClr val="tx2">
-                    <a:lumMod val="75000"/>
-                  </a:schemeClr>
-                </a:solidFill>
-                <a:latin typeface="Consolas" panose="020B0609020204030204" pitchFamily="49" charset="0"/>
-              </a:rPr>
-              <a:t>funs_arg</a:t>
-            </a:r>
-            <a:r>
-              <a:rPr lang="fr-FR" dirty="0">
-                <a:solidFill>
-                  <a:schemeClr val="tx2">
-                    <a:lumMod val="75000"/>
-                  </a:schemeClr>
-                </a:solidFill>
-                <a:latin typeface="Consolas" panose="020B0609020204030204" pitchFamily="49" charset="0"/>
-              </a:rPr>
-              <a:t>=</a:t>
-            </a:r>
-            <a:r>
-              <a:rPr lang="fr-FR" dirty="0" err="1">
-                <a:solidFill>
-                  <a:schemeClr val="tx2">
-                    <a:lumMod val="75000"/>
-                  </a:schemeClr>
-                </a:solidFill>
-                <a:latin typeface="Consolas" panose="020B0609020204030204" pitchFamily="49" charset="0"/>
-              </a:rPr>
-              <a:t>list</a:t>
-            </a:r>
-            <a:r>
-              <a:rPr lang="fr-FR" dirty="0">
-                <a:solidFill>
-                  <a:schemeClr val="tx2">
-                    <a:lumMod val="75000"/>
-                  </a:schemeClr>
-                </a:solidFill>
-                <a:latin typeface="Consolas" panose="020B0609020204030204" pitchFamily="49" charset="0"/>
-              </a:rPr>
-              <a:t>(digits=3)</a:t>
-            </a:r>
-          </a:p>
-        </p:txBody>
-      </p:sp>
-      <p:cxnSp>
-        <p:nvCxnSpPr>
-          <p:cNvPr id="86" name="Connecteur droit avec flèche 85">
-            <a:extLst>
-              <a:ext uri="{FF2B5EF4-FFF2-40B4-BE49-F238E27FC236}">
-                <a16:creationId xmlns:a16="http://schemas.microsoft.com/office/drawing/2014/main" id="{427C0EF6-446D-4C3E-9D46-BB81690FB611}"/>
-              </a:ext>
-            </a:extLst>
-          </p:cNvPr>
-          <p:cNvCxnSpPr>
-            <a:cxnSpLocks/>
-          </p:cNvCxnSpPr>
-          <p:nvPr/>
-        </p:nvCxnSpPr>
-        <p:spPr>
-          <a:xfrm flipH="1" flipV="1">
-            <a:off x="7696200" y="7516155"/>
-            <a:ext cx="900000" cy="900000"/>
-          </a:xfrm>
-          <a:prstGeom prst="straightConnector1">
-            <a:avLst/>
-          </a:prstGeom>
-          <a:ln w="76200">
-            <a:solidFill>
-              <a:schemeClr val="tx2">
-                <a:lumMod val="75000"/>
-              </a:schemeClr>
-            </a:solidFill>
-            <a:tailEnd type="triangle"/>
-          </a:ln>
-        </p:spPr>
-        <p:style>
-          <a:lnRef idx="1">
-            <a:schemeClr val="accent1"/>
-          </a:lnRef>
-          <a:fillRef idx="0">
-            <a:schemeClr val="accent1"/>
-          </a:fillRef>
-          <a:effectRef idx="0">
-            <a:schemeClr val="accent1"/>
-          </a:effectRef>
-          <a:fontRef idx="minor">
-            <a:schemeClr val="tx1"/>
-          </a:fontRef>
-        </p:style>
-      </p:cxnSp>
     </p:spTree>
     <p:extLst>
       <p:ext uri="{BB962C8B-B14F-4D97-AF65-F5344CB8AC3E}">
@@ -6426,136 +6506,6 @@
                 <a:latin typeface="Consolas" panose="020B0609020204030204" pitchFamily="49" charset="0"/>
               </a:rPr>
               <a:t>=c(.25,.75))</a:t>
-            </a:r>
-          </a:p>
-        </p:txBody>
-      </p:sp>
-      <p:cxnSp>
-        <p:nvCxnSpPr>
-          <p:cNvPr id="81" name="Connecteur droit avec flèche 80">
-            <a:extLst>
-              <a:ext uri="{FF2B5EF4-FFF2-40B4-BE49-F238E27FC236}">
-                <a16:creationId xmlns:a16="http://schemas.microsoft.com/office/drawing/2014/main" id="{137A21B9-F028-4105-AD87-B50563C3C8E7}"/>
-              </a:ext>
-            </a:extLst>
-          </p:cNvPr>
-          <p:cNvCxnSpPr>
-            <a:cxnSpLocks/>
-            <a:stCxn id="83" idx="0"/>
-          </p:cNvCxnSpPr>
-          <p:nvPr/>
-        </p:nvCxnSpPr>
-        <p:spPr>
-          <a:xfrm flipH="1" flipV="1">
-            <a:off x="13918213" y="7832051"/>
-            <a:ext cx="611627" cy="594064"/>
-          </a:xfrm>
-          <a:prstGeom prst="straightConnector1">
-            <a:avLst/>
-          </a:prstGeom>
-          <a:ln w="76200">
-            <a:solidFill>
-              <a:schemeClr val="tx2">
-                <a:lumMod val="75000"/>
-              </a:schemeClr>
-            </a:solidFill>
-            <a:tailEnd type="triangle"/>
-          </a:ln>
-        </p:spPr>
-        <p:style>
-          <a:lnRef idx="1">
-            <a:schemeClr val="accent1"/>
-          </a:lnRef>
-          <a:fillRef idx="0">
-            <a:schemeClr val="accent1"/>
-          </a:fillRef>
-          <a:effectRef idx="0">
-            <a:schemeClr val="accent1"/>
-          </a:effectRef>
-          <a:fontRef idx="minor">
-            <a:schemeClr val="tx1"/>
-          </a:fontRef>
-        </p:style>
-      </p:cxnSp>
-      <p:sp>
-        <p:nvSpPr>
-          <p:cNvPr id="83" name="ZoneTexte 82">
-            <a:extLst>
-              <a:ext uri="{FF2B5EF4-FFF2-40B4-BE49-F238E27FC236}">
-                <a16:creationId xmlns:a16="http://schemas.microsoft.com/office/drawing/2014/main" id="{981D1829-8E3B-43F6-944F-57501984584C}"/>
-              </a:ext>
-            </a:extLst>
-          </p:cNvPr>
-          <p:cNvSpPr txBox="1"/>
-          <p:nvPr/>
-        </p:nvSpPr>
-        <p:spPr>
-          <a:xfrm>
-            <a:off x="12981178" y="8426115"/>
-            <a:ext cx="3097323" cy="369332"/>
-          </a:xfrm>
-          <a:prstGeom prst="rect">
-            <a:avLst/>
-          </a:prstGeom>
-          <a:noFill/>
-          <a:ln>
-            <a:solidFill>
-              <a:schemeClr val="tx1">
-                <a:lumMod val="85000"/>
-                <a:lumOff val="15000"/>
-              </a:schemeClr>
-            </a:solidFill>
-          </a:ln>
-        </p:spPr>
-        <p:txBody>
-          <a:bodyPr wrap="none" rtlCol="0">
-            <a:spAutoFit/>
-          </a:bodyPr>
-          <a:lstStyle/>
-          <a:p>
-            <a:r>
-              <a:rPr lang="fr-FR" dirty="0" err="1">
-                <a:solidFill>
-                  <a:schemeClr val="tx2">
-                    <a:lumMod val="75000"/>
-                  </a:schemeClr>
-                </a:solidFill>
-                <a:latin typeface="Consolas" panose="020B0609020204030204" pitchFamily="49" charset="0"/>
-              </a:rPr>
-              <a:t>funs_arg</a:t>
-            </a:r>
-            <a:r>
-              <a:rPr lang="fr-FR" dirty="0">
-                <a:solidFill>
-                  <a:schemeClr val="tx2">
-                    <a:lumMod val="75000"/>
-                  </a:schemeClr>
-                </a:solidFill>
-                <a:latin typeface="Consolas" panose="020B0609020204030204" pitchFamily="49" charset="0"/>
-              </a:rPr>
-              <a:t>=</a:t>
-            </a:r>
-            <a:r>
-              <a:rPr lang="fr-FR" dirty="0" err="1">
-                <a:solidFill>
-                  <a:schemeClr val="tx2">
-                    <a:lumMod val="75000"/>
-                  </a:schemeClr>
-                </a:solidFill>
-                <a:latin typeface="Consolas" panose="020B0609020204030204" pitchFamily="49" charset="0"/>
-              </a:rPr>
-              <a:t>list</a:t>
-            </a:r>
-            <a:r>
-              <a:rPr lang="fr-FR" dirty="0">
-                <a:solidFill>
-                  <a:schemeClr val="tx2">
-                    <a:lumMod val="75000"/>
-                  </a:schemeClr>
-                </a:solidFill>
-                <a:latin typeface="Consolas" panose="020B0609020204030204" pitchFamily="49" charset="0"/>
-              </a:rPr>
-              <a:t>(digits=3)</a:t>
             </a:r>
           </a:p>
         </p:txBody>
@@ -6979,22 +6929,19 @@
               <a:rPr lang="en-US" dirty="0">
                 <a:latin typeface="Consolas" panose="020B0609020204030204" pitchFamily="49" charset="0"/>
               </a:rPr>
-              <a:t>), digits=</a:t>
+              <a:t>) , </a:t>
+            </a:r>
+            <a:r>
+              <a:rPr lang="en-US" dirty="0" err="1">
+                <a:latin typeface="Consolas" panose="020B0609020204030204" pitchFamily="49" charset="0"/>
+              </a:rPr>
+              <a:t>num_digits</a:t>
             </a:r>
             <a:r>
               <a:rPr lang="en-US" dirty="0">
-                <a:solidFill>
-                  <a:schemeClr val="accent1"/>
-                </a:solidFill>
-                <a:latin typeface="Consolas" panose="020B0609020204030204" pitchFamily="49" charset="0"/>
-              </a:rPr>
-              <a:t>3</a:t>
-            </a:r>
-            <a:r>
-              <a:rPr lang="en-US" dirty="0">
-                <a:latin typeface="Consolas" panose="020B0609020204030204" pitchFamily="49" charset="0"/>
-              </a:rPr>
-              <a:t>)) %&gt;% </a:t>
+                <a:latin typeface="Consolas" panose="020B0609020204030204" pitchFamily="49" charset="0"/>
+              </a:rPr>
+              <a:t>=3) %&gt;% </a:t>
             </a:r>
           </a:p>
           <a:p>
@@ -7037,6 +6984,114 @@
             <a:endParaRPr lang="fr-FR" dirty="0">
               <a:latin typeface="Consolas" panose="020B0609020204030204" pitchFamily="49" charset="0"/>
             </a:endParaRPr>
+          </a:p>
+        </p:txBody>
+      </p:sp>
+      <p:cxnSp>
+        <p:nvCxnSpPr>
+          <p:cNvPr id="22" name="Connecteur droit avec flèche 21">
+            <a:extLst>
+              <a:ext uri="{FF2B5EF4-FFF2-40B4-BE49-F238E27FC236}">
+                <a16:creationId xmlns:a16="http://schemas.microsoft.com/office/drawing/2014/main" id="{58B98A82-33DC-43D6-8B84-4A81C2DE672C}"/>
+              </a:ext>
+            </a:extLst>
+          </p:cNvPr>
+          <p:cNvCxnSpPr>
+            <a:cxnSpLocks/>
+            <a:stCxn id="25" idx="0"/>
+          </p:cNvCxnSpPr>
+          <p:nvPr/>
+        </p:nvCxnSpPr>
+        <p:spPr>
+          <a:xfrm flipH="1" flipV="1">
+            <a:off x="13926134" y="7696155"/>
+            <a:ext cx="720000" cy="720000"/>
+          </a:xfrm>
+          <a:prstGeom prst="straightConnector1">
+            <a:avLst/>
+          </a:prstGeom>
+          <a:ln w="76200">
+            <a:solidFill>
+              <a:schemeClr val="tx2">
+                <a:lumMod val="75000"/>
+              </a:schemeClr>
+            </a:solidFill>
+            <a:tailEnd type="triangle"/>
+          </a:ln>
+        </p:spPr>
+        <p:style>
+          <a:lnRef idx="1">
+            <a:schemeClr val="accent1"/>
+          </a:lnRef>
+          <a:fillRef idx="0">
+            <a:schemeClr val="accent1"/>
+          </a:fillRef>
+          <a:effectRef idx="0">
+            <a:schemeClr val="accent1"/>
+          </a:effectRef>
+          <a:fontRef idx="minor">
+            <a:schemeClr val="tx1"/>
+          </a:fontRef>
+        </p:style>
+      </p:cxnSp>
+      <p:sp>
+        <p:nvSpPr>
+          <p:cNvPr id="25" name="ZoneTexte 24">
+            <a:extLst>
+              <a:ext uri="{FF2B5EF4-FFF2-40B4-BE49-F238E27FC236}">
+                <a16:creationId xmlns:a16="http://schemas.microsoft.com/office/drawing/2014/main" id="{CE0FC226-C907-47E9-BD30-3288AB09672C}"/>
+              </a:ext>
+            </a:extLst>
+          </p:cNvPr>
+          <p:cNvSpPr txBox="1"/>
+          <p:nvPr/>
+        </p:nvSpPr>
+        <p:spPr>
+          <a:xfrm>
+            <a:off x="13793977" y="8416155"/>
+            <a:ext cx="1704313" cy="369332"/>
+          </a:xfrm>
+          <a:prstGeom prst="rect">
+            <a:avLst/>
+          </a:prstGeom>
+          <a:noFill/>
+          <a:ln>
+            <a:solidFill>
+              <a:schemeClr val="tx1">
+                <a:lumMod val="85000"/>
+                <a:lumOff val="15000"/>
+              </a:schemeClr>
+            </a:solidFill>
+          </a:ln>
+        </p:spPr>
+        <p:txBody>
+          <a:bodyPr wrap="none" rtlCol="0">
+            <a:spAutoFit/>
+          </a:bodyPr>
+          <a:lstStyle/>
+          <a:p>
+            <a:r>
+              <a:rPr lang="fr-FR" dirty="0" err="1">
+                <a:solidFill>
+                  <a:schemeClr val="tx2">
+                    <a:lumMod val="75000"/>
+                  </a:schemeClr>
+                </a:solidFill>
+                <a:latin typeface="Consolas" panose="020B0609020204030204" pitchFamily="49" charset="0"/>
+              </a:rPr>
+              <a:t>num_digits</a:t>
+            </a:r>
+            <a:r>
+              <a:rPr lang="fr-FR" dirty="0">
+                <a:solidFill>
+                  <a:schemeClr val="tx2">
+                    <a:lumMod val="75000"/>
+                  </a:schemeClr>
+                </a:solidFill>
+                <a:latin typeface="Consolas" panose="020B0609020204030204" pitchFamily="49" charset="0"/>
+              </a:rPr>
+              <a:t>=3</a:t>
+            </a:r>
           </a:p>
         </p:txBody>
       </p:sp>

</xml_diff>